<commit_message>
module 3 in mvc 4
</commit_message>
<xml_diff>
--- a/mvc/slides/03_Views.pptx
+++ b/mvc/slides/03_Views.pptx
@@ -5,10 +5,10 @@
     <p:sldMasterId id="2147483772" r:id="rId1"/>
   </p:sldMasterIdLst>
   <p:notesMasterIdLst>
-    <p:notesMasterId r:id="rId27"/>
+    <p:notesMasterId r:id="rId24"/>
   </p:notesMasterIdLst>
   <p:handoutMasterIdLst>
-    <p:handoutMasterId r:id="rId28"/>
+    <p:handoutMasterId r:id="rId25"/>
   </p:handoutMasterIdLst>
   <p:sldIdLst>
     <p:sldId id="327" r:id="rId2"/>
@@ -30,12 +30,9 @@
     <p:sldId id="385" r:id="rId18"/>
     <p:sldId id="386" r:id="rId19"/>
     <p:sldId id="387" r:id="rId20"/>
-    <p:sldId id="388" r:id="rId21"/>
-    <p:sldId id="383" r:id="rId22"/>
-    <p:sldId id="375" r:id="rId23"/>
-    <p:sldId id="378" r:id="rId24"/>
-    <p:sldId id="380" r:id="rId25"/>
-    <p:sldId id="363" r:id="rId26"/>
+    <p:sldId id="375" r:id="rId21"/>
+    <p:sldId id="378" r:id="rId22"/>
+    <p:sldId id="363" r:id="rId23"/>
   </p:sldIdLst>
   <p:sldSz cx="9144000" cy="6858000" type="screen4x3"/>
   <p:notesSz cx="7302500" cy="9588500"/>
@@ -258,7 +255,7 @@
               <a:pPr>
                 <a:defRPr/>
               </a:pPr>
-              <a:t>7/7/2012</a:t>
+              <a:t>8/15/2012</a:t>
             </a:fld>
             <a:endParaRPr lang="en-US"/>
           </a:p>
@@ -1241,7 +1238,7 @@
               <a:pPr>
                 <a:defRPr/>
               </a:pPr>
-              <a:t>22</a:t>
+              <a:t>20</a:t>
             </a:fld>
             <a:endParaRPr lang="en-US"/>
           </a:p>
@@ -1296,7 +1293,7 @@
             <a:fld id="{6F8E712A-3391-44E3-B8E1-37AE61B13131}" type="slidenum">
               <a:rPr lang="en-US" smtClean="0"/>
               <a:pPr/>
-              <a:t>25</a:t>
+              <a:t>22</a:t>
             </a:fld>
             <a:endParaRPr lang="en-US" smtClean="0"/>
           </a:p>
@@ -3208,6 +3205,10 @@
           <a:lstStyle/>
           <a:p>
             <a:pPr defTabSz="914400" eaLnBrk="1" hangingPunct="1"/>
+            <a:r>
+              <a:rPr lang="en-US" dirty="0" smtClean="0"/>
+              <a:t>V is for View</a:t>
+            </a:r>
             <a:endParaRPr lang="en-US" dirty="0" smtClean="0"/>
           </a:p>
         </p:txBody>
@@ -5185,7 +5186,7 @@
         </p:nvSpPr>
         <p:spPr bwMode="auto">
           <a:xfrm>
-            <a:off x="838200" y="3276600"/>
+            <a:off x="838200" y="3505200"/>
             <a:ext cx="7391400" cy="2209800"/>
           </a:xfrm>
           <a:prstGeom prst="rect">
@@ -9431,416 +9432,6 @@
           <a:p>
             <a:r>
               <a:rPr lang="en-US" dirty="0" smtClean="0"/>
-              <a:t>Custom Templates</a:t>
-            </a:r>
-            <a:endParaRPr lang="en-US" dirty="0"/>
-          </a:p>
-        </p:txBody>
-      </p:sp>
-      <p:sp>
-        <p:nvSpPr>
-          <p:cNvPr id="3" name="Text Placeholder 2"/>
-          <p:cNvSpPr>
-            <a:spLocks noGrp="1"/>
-          </p:cNvSpPr>
-          <p:nvPr>
-            <p:ph type="body" idx="1"/>
-          </p:nvPr>
-        </p:nvSpPr>
-        <p:spPr>
-          <a:xfrm>
-            <a:off x="457200" y="1371600"/>
-            <a:ext cx="8229600" cy="1676400"/>
-          </a:xfrm>
-        </p:spPr>
-        <p:txBody>
-          <a:bodyPr/>
-          <a:lstStyle/>
-          <a:p>
-            <a:r>
-              <a:rPr lang="en-US" dirty="0" err="1" smtClean="0"/>
-              <a:t>DisplayTemplates</a:t>
-            </a:r>
-            <a:endParaRPr lang="en-US" dirty="0" smtClean="0"/>
-          </a:p>
-          <a:p>
-            <a:r>
-              <a:rPr lang="en-US" dirty="0" err="1" smtClean="0"/>
-              <a:t>EditorTemplates</a:t>
-            </a:r>
-            <a:endParaRPr lang="en-US" dirty="0" smtClean="0"/>
-          </a:p>
-          <a:p>
-            <a:r>
-              <a:rPr lang="en-US" dirty="0" smtClean="0"/>
-              <a:t>Template selected based on type</a:t>
-            </a:r>
-          </a:p>
-        </p:txBody>
-      </p:sp>
-      <p:sp>
-        <p:nvSpPr>
-          <p:cNvPr id="5" name="Text Placeholder 2"/>
-          <p:cNvSpPr txBox="1">
-            <a:spLocks/>
-          </p:cNvSpPr>
-          <p:nvPr/>
-        </p:nvSpPr>
-        <p:spPr bwMode="auto">
-          <a:xfrm>
-            <a:off x="1447800" y="5029200"/>
-            <a:ext cx="5181600" cy="609600"/>
-          </a:xfrm>
-          <a:prstGeom prst="rect">
-            <a:avLst/>
-          </a:prstGeom>
-          <a:solidFill>
-            <a:schemeClr val="accent2"/>
-          </a:solidFill>
-          <a:ln w="9525">
-            <a:solidFill>
-              <a:schemeClr val="tx1"/>
-            </a:solidFill>
-            <a:miter lim="800000"/>
-            <a:headEnd/>
-            <a:tailEnd/>
-          </a:ln>
-        </p:spPr>
-        <p:txBody>
-          <a:bodyPr vert="horz" wrap="square" lIns="91440" tIns="45720" rIns="91440" bIns="45720" numCol="1" anchor="t" anchorCtr="0" compatLnSpc="1">
-            <a:prstTxWarp prst="textNoShape">
-              <a:avLst/>
-            </a:prstTxWarp>
-          </a:bodyPr>
-          <a:lstStyle/>
-          <a:p>
-            <a:pPr marL="0" marR="0" algn="l">
-              <a:lnSpc>
-                <a:spcPct val="115000"/>
-              </a:lnSpc>
-              <a:spcBef>
-                <a:spcPts val="0"/>
-              </a:spcBef>
-              <a:spcAft>
-                <a:spcPts val="0"/>
-              </a:spcAft>
-            </a:pPr>
-            <a:r>
-              <a:rPr lang="en-US" b="0" dirty="0" smtClean="0">
-                <a:latin typeface="Consolas"/>
-              </a:rPr>
-              <a:t>@</a:t>
-            </a:r>
-            <a:r>
-              <a:rPr lang="en-US" b="0" dirty="0" err="1" smtClean="0">
-                <a:latin typeface="Consolas"/>
-              </a:rPr>
-              <a:t>ViewData.TemplateInfo.FormattedModelValue</a:t>
-            </a:r>
-            <a:endParaRPr kumimoji="0" lang="en-US" b="0" i="0" u="none" strike="noStrike" kern="0" cap="none" spc="0" normalizeH="0" baseline="0" noProof="0" dirty="0">
-              <a:ln>
-                <a:noFill/>
-              </a:ln>
-              <a:solidFill>
-                <a:schemeClr val="tx1"/>
-              </a:solidFill>
-              <a:effectLst/>
-              <a:uLnTx/>
-              <a:uFillTx/>
-              <a:latin typeface="Consolas" pitchFamily="49" charset="0"/>
-              <a:cs typeface="Segoe UI" pitchFamily="34" charset="0"/>
-            </a:endParaRPr>
-          </a:p>
-        </p:txBody>
-      </p:sp>
-      <p:pic>
-        <p:nvPicPr>
-          <p:cNvPr id="1026" name="Picture 2"/>
-          <p:cNvPicPr>
-            <a:picLocks noChangeAspect="1" noChangeArrowheads="1"/>
-          </p:cNvPicPr>
-          <p:nvPr/>
-        </p:nvPicPr>
-        <p:blipFill>
-          <a:blip r:embed="rId2">
-            <a:extLst>
-              <a:ext uri="{28A0092B-C50C-407E-A947-70E740481C1C}">
-                <a14:useLocalDpi xmlns:a14="http://schemas.microsoft.com/office/drawing/2010/main" val="0"/>
-              </a:ext>
-            </a:extLst>
-          </a:blip>
-          <a:srcRect/>
-          <a:stretch>
-            <a:fillRect/>
-          </a:stretch>
-        </p:blipFill>
-        <p:spPr bwMode="auto">
-          <a:xfrm>
-            <a:off x="5486400" y="1532494"/>
-            <a:ext cx="3409708" cy="2481048"/>
-          </a:xfrm>
-          <a:prstGeom prst="rect">
-            <a:avLst/>
-          </a:prstGeom>
-          <a:noFill/>
-          <a:ln>
-            <a:noFill/>
-          </a:ln>
-          <a:effectLst/>
-          <a:extLst>
-            <a:ext uri="{909E8E84-426E-40DD-AFC4-6F175D3DCCD1}">
-              <a14:hiddenFill xmlns:a14="http://schemas.microsoft.com/office/drawing/2010/main">
-                <a:solidFill>
-                  <a:schemeClr val="accent1"/>
-                </a:solidFill>
-              </a14:hiddenFill>
-            </a:ext>
-            <a:ext uri="{91240B29-F687-4F45-9708-019B960494DF}">
-              <a14:hiddenLine xmlns:a14="http://schemas.microsoft.com/office/drawing/2010/main" w="9525">
-                <a:solidFill>
-                  <a:schemeClr val="tx1"/>
-                </a:solidFill>
-                <a:miter lim="800000"/>
-                <a:headEnd/>
-                <a:tailEnd/>
-              </a14:hiddenLine>
-            </a:ext>
-            <a:ext uri="{AF507438-7753-43E0-B8FC-AC1667EBCBE1}">
-              <a14:hiddenEffects xmlns:a14="http://schemas.microsoft.com/office/drawing/2010/main">
-                <a:effectLst>
-                  <a:outerShdw dist="35921" dir="2700000" algn="ctr" rotWithShape="0">
-                    <a:schemeClr val="bg2"/>
-                  </a:outerShdw>
-                </a:effectLst>
-              </a14:hiddenEffects>
-            </a:ext>
-          </a:extLst>
-        </p:spPr>
-      </p:pic>
-      <p:sp>
-        <p:nvSpPr>
-          <p:cNvPr id="6" name="Bent Arrow 5"/>
-          <p:cNvSpPr/>
-          <p:nvPr/>
-        </p:nvSpPr>
-        <p:spPr bwMode="auto">
-          <a:xfrm rot="16200000" flipH="1">
-            <a:off x="4643911" y="3386907"/>
-            <a:ext cx="2159259" cy="931481"/>
-          </a:xfrm>
-          <a:prstGeom prst="bentArrow">
-            <a:avLst>
-              <a:gd name="adj1" fmla="val 25000"/>
-              <a:gd name="adj2" fmla="val 20195"/>
-              <a:gd name="adj3" fmla="val 25000"/>
-              <a:gd name="adj4" fmla="val 43750"/>
-            </a:avLst>
-          </a:prstGeom>
-          <a:gradFill rotWithShape="1">
-            <a:gsLst>
-              <a:gs pos="0">
-                <a:srgbClr val="A4D289"/>
-              </a:gs>
-              <a:gs pos="100000">
-                <a:schemeClr val="bg1"/>
-              </a:gs>
-            </a:gsLst>
-            <a:lin ang="5400000" scaled="1"/>
-          </a:gradFill>
-          <a:ln w="9525" algn="ctr">
-            <a:solidFill>
-              <a:schemeClr val="tx1"/>
-            </a:solidFill>
-            <a:miter lim="800000"/>
-            <a:headEnd/>
-            <a:tailEnd/>
-          </a:ln>
-          <a:effectLst>
-            <a:outerShdw blurRad="50800" dist="38100" dir="2700000" algn="tl" rotWithShape="0">
-              <a:prstClr val="black">
-                <a:alpha val="40000"/>
-              </a:prstClr>
-            </a:outerShdw>
-          </a:effectLst>
-        </p:spPr>
-        <p:txBody>
-          <a:bodyPr wrap="none" rtlCol="0" anchor="ctr"/>
-          <a:lstStyle/>
-          <a:p>
-            <a:pPr algn="ctr"/>
-            <a:endParaRPr lang="en-US" sz="2000" dirty="0">
-              <a:latin typeface="Tekton Pro" pitchFamily="34" charset="0"/>
-            </a:endParaRPr>
-          </a:p>
-        </p:txBody>
-      </p:sp>
-    </p:spTree>
-    <p:extLst>
-      <p:ext uri="{BB962C8B-B14F-4D97-AF65-F5344CB8AC3E}">
-        <p14:creationId xmlns:p14="http://schemas.microsoft.com/office/powerpoint/2010/main" val="2703075176"/>
-      </p:ext>
-    </p:extLst>
-  </p:cSld>
-  <p:clrMapOvr>
-    <a:masterClrMapping/>
-  </p:clrMapOvr>
-  <p:transition>
-    <p:fade/>
-  </p:transition>
-</p:sld>
-</file>
-
-<file path=ppt/slides/slide21.xml><?xml version="1.0" encoding="utf-8"?>
-<p:sld xmlns:a="http://schemas.openxmlformats.org/drawingml/2006/main" xmlns:r="http://schemas.openxmlformats.org/officeDocument/2006/relationships" xmlns:p="http://schemas.openxmlformats.org/presentationml/2006/main">
-  <p:cSld>
-    <p:spTree>
-      <p:nvGrpSpPr>
-        <p:cNvPr id="1" name=""/>
-        <p:cNvGrpSpPr/>
-        <p:nvPr/>
-      </p:nvGrpSpPr>
-      <p:grpSpPr>
-        <a:xfrm>
-          <a:off x="0" y="0"/>
-          <a:ext cx="0" cy="0"/>
-          <a:chOff x="0" y="0"/>
-          <a:chExt cx="0" cy="0"/>
-        </a:xfrm>
-      </p:grpSpPr>
-      <p:sp>
-        <p:nvSpPr>
-          <p:cNvPr id="2" name="Title 1"/>
-          <p:cNvSpPr>
-            <a:spLocks noGrp="1"/>
-          </p:cNvSpPr>
-          <p:nvPr>
-            <p:ph type="title"/>
-          </p:nvPr>
-        </p:nvSpPr>
-        <p:spPr/>
-        <p:txBody>
-          <a:bodyPr/>
-          <a:lstStyle/>
-          <a:p>
-            <a:r>
-              <a:rPr lang="en-US" dirty="0" smtClean="0"/>
-              <a:t>Custom T4 Templates</a:t>
-            </a:r>
-            <a:endParaRPr lang="en-US" dirty="0"/>
-          </a:p>
-        </p:txBody>
-      </p:sp>
-      <p:sp>
-        <p:nvSpPr>
-          <p:cNvPr id="3" name="Text Placeholder 2"/>
-          <p:cNvSpPr>
-            <a:spLocks noGrp="1"/>
-          </p:cNvSpPr>
-          <p:nvPr>
-            <p:ph type="body" idx="1"/>
-          </p:nvPr>
-        </p:nvSpPr>
-        <p:spPr/>
-        <p:txBody>
-          <a:bodyPr/>
-          <a:lstStyle/>
-          <a:p>
-            <a:r>
-              <a:rPr lang="en-US" dirty="0" smtClean="0"/>
-              <a:t>Text Template Transformation Toolkit</a:t>
-            </a:r>
-          </a:p>
-          <a:p>
-            <a:pPr lvl="1"/>
-            <a:r>
-              <a:rPr lang="en-US" dirty="0" smtClean="0"/>
-              <a:t>Code generation tool</a:t>
-            </a:r>
-          </a:p>
-          <a:p>
-            <a:pPr lvl="1"/>
-            <a:r>
-              <a:rPr lang="en-US" dirty="0" smtClean="0"/>
-              <a:t>Built into Visual Studio</a:t>
-            </a:r>
-          </a:p>
-          <a:p>
-            <a:r>
-              <a:rPr lang="en-US" dirty="0" smtClean="0"/>
-              <a:t>Customize “Add Controller” and “Add View” code generation</a:t>
-            </a:r>
-          </a:p>
-          <a:p>
-            <a:pPr lvl="1"/>
-            <a:r>
-              <a:rPr lang="en-US" dirty="0" smtClean="0"/>
-              <a:t>Copy templates into project</a:t>
-            </a:r>
-          </a:p>
-          <a:p>
-            <a:pPr lvl="1"/>
-            <a:r>
-              <a:rPr lang="en-US" dirty="0" smtClean="0"/>
-              <a:t>Remove custom build step</a:t>
-            </a:r>
-          </a:p>
-          <a:p>
-            <a:pPr lvl="1">
-              <a:buNone/>
-            </a:pPr>
-            <a:endParaRPr lang="en-US" dirty="0" smtClean="0"/>
-          </a:p>
-          <a:p>
-            <a:pPr lvl="1"/>
-            <a:endParaRPr lang="en-US" dirty="0"/>
-          </a:p>
-        </p:txBody>
-      </p:sp>
-    </p:spTree>
-  </p:cSld>
-  <p:clrMapOvr>
-    <a:masterClrMapping/>
-  </p:clrMapOvr>
-  <p:transition>
-    <p:fade/>
-  </p:transition>
-</p:sld>
-</file>
-
-<file path=ppt/slides/slide22.xml><?xml version="1.0" encoding="utf-8"?>
-<p:sld xmlns:a="http://schemas.openxmlformats.org/drawingml/2006/main" xmlns:r="http://schemas.openxmlformats.org/officeDocument/2006/relationships" xmlns:p="http://schemas.openxmlformats.org/presentationml/2006/main">
-  <p:cSld>
-    <p:spTree>
-      <p:nvGrpSpPr>
-        <p:cNvPr id="1" name=""/>
-        <p:cNvGrpSpPr/>
-        <p:nvPr/>
-      </p:nvGrpSpPr>
-      <p:grpSpPr>
-        <a:xfrm>
-          <a:off x="0" y="0"/>
-          <a:ext cx="0" cy="0"/>
-          <a:chOff x="0" y="0"/>
-          <a:chExt cx="0" cy="0"/>
-        </a:xfrm>
-      </p:grpSpPr>
-      <p:sp>
-        <p:nvSpPr>
-          <p:cNvPr id="2" name="Title 1"/>
-          <p:cNvSpPr>
-            <a:spLocks noGrp="1"/>
-          </p:cNvSpPr>
-          <p:nvPr>
-            <p:ph type="title"/>
-          </p:nvPr>
-        </p:nvSpPr>
-        <p:spPr/>
-        <p:txBody>
-          <a:bodyPr/>
-          <a:lstStyle/>
-          <a:p>
-            <a:r>
-              <a:rPr lang="en-US" dirty="0" smtClean="0"/>
               <a:t>Security</a:t>
             </a:r>
             <a:endParaRPr lang="en-US" dirty="0"/>
@@ -10390,7 +9981,7 @@
 </p:sld>
 </file>
 
-<file path=ppt/slides/slide23.xml><?xml version="1.0" encoding="utf-8"?>
+<file path=ppt/slides/slide21.xml><?xml version="1.0" encoding="utf-8"?>
 <p:sld xmlns:a="http://schemas.openxmlformats.org/drawingml/2006/main" xmlns:r="http://schemas.openxmlformats.org/officeDocument/2006/relationships" xmlns:p="http://schemas.openxmlformats.org/presentationml/2006/main">
   <p:cSld>
     <p:spTree>
@@ -11008,141 +10599,7 @@
 </p:sld>
 </file>
 
-<file path=ppt/slides/slide24.xml><?xml version="1.0" encoding="utf-8"?>
-<p:sld xmlns:a="http://schemas.openxmlformats.org/drawingml/2006/main" xmlns:r="http://schemas.openxmlformats.org/officeDocument/2006/relationships" xmlns:p="http://schemas.openxmlformats.org/presentationml/2006/main">
-  <p:cSld>
-    <p:spTree>
-      <p:nvGrpSpPr>
-        <p:cNvPr id="1" name=""/>
-        <p:cNvGrpSpPr/>
-        <p:nvPr/>
-      </p:nvGrpSpPr>
-      <p:grpSpPr>
-        <a:xfrm>
-          <a:off x="0" y="0"/>
-          <a:ext cx="0" cy="0"/>
-          <a:chOff x="0" y="0"/>
-          <a:chExt cx="0" cy="0"/>
-        </a:xfrm>
-      </p:grpSpPr>
-      <p:sp>
-        <p:nvSpPr>
-          <p:cNvPr id="2" name="Title 1"/>
-          <p:cNvSpPr>
-            <a:spLocks noGrp="1"/>
-          </p:cNvSpPr>
-          <p:nvPr>
-            <p:ph type="title"/>
-          </p:nvPr>
-        </p:nvSpPr>
-        <p:spPr/>
-        <p:txBody>
-          <a:bodyPr/>
-          <a:lstStyle/>
-          <a:p>
-            <a:r>
-              <a:rPr lang="en-US" dirty="0" smtClean="0"/>
-              <a:t>Alternate View Engines</a:t>
-            </a:r>
-            <a:endParaRPr lang="en-US" dirty="0"/>
-          </a:p>
-        </p:txBody>
-      </p:sp>
-      <p:sp>
-        <p:nvSpPr>
-          <p:cNvPr id="3" name="Text Placeholder 2"/>
-          <p:cNvSpPr>
-            <a:spLocks noGrp="1"/>
-          </p:cNvSpPr>
-          <p:nvPr>
-            <p:ph type="body" idx="1"/>
-          </p:nvPr>
-        </p:nvSpPr>
-        <p:spPr/>
-        <p:txBody>
-          <a:bodyPr/>
-          <a:lstStyle/>
-          <a:p>
-            <a:r>
-              <a:rPr lang="en-US" dirty="0" smtClean="0"/>
-              <a:t>Spark </a:t>
-            </a:r>
-          </a:p>
-          <a:p>
-            <a:pPr lvl="1"/>
-            <a:r>
-              <a:rPr lang="en-US" dirty="0" smtClean="0"/>
-              <a:t>http://sparkviewengine.com/</a:t>
-            </a:r>
-          </a:p>
-          <a:p>
-            <a:r>
-              <a:rPr lang="en-US" dirty="0" err="1" smtClean="0"/>
-              <a:t>NHaml</a:t>
-            </a:r>
-            <a:endParaRPr lang="en-US" dirty="0" smtClean="0"/>
-          </a:p>
-          <a:p>
-            <a:pPr lvl="1"/>
-            <a:r>
-              <a:rPr lang="en-US" dirty="0"/>
-              <a:t>https://github.com/NHaml/NHaml</a:t>
-            </a:r>
-            <a:endParaRPr lang="en-US" dirty="0" smtClean="0"/>
-          </a:p>
-          <a:p>
-            <a:r>
-              <a:rPr lang="en-US" dirty="0" smtClean="0"/>
-              <a:t>Brail</a:t>
-            </a:r>
-          </a:p>
-          <a:p>
-            <a:pPr lvl="1"/>
-            <a:r>
-              <a:rPr lang="en-US" dirty="0" smtClean="0"/>
-              <a:t>http://www.castleproject.org/monorail/documentation/v1rc2/viewengines/brail/index.html</a:t>
-            </a:r>
-          </a:p>
-          <a:p>
-            <a:r>
-              <a:rPr lang="en-US" dirty="0" err="1" smtClean="0"/>
-              <a:t>NVelocity</a:t>
-            </a:r>
-            <a:endParaRPr lang="en-US" dirty="0" smtClean="0"/>
-          </a:p>
-          <a:p>
-            <a:pPr lvl="1"/>
-            <a:r>
-              <a:rPr lang="en-US" dirty="0" smtClean="0"/>
-              <a:t>http://nvelocity.sourceforge.net</a:t>
-            </a:r>
-            <a:r>
-              <a:rPr lang="en-US" dirty="0" smtClean="0"/>
-              <a:t>/</a:t>
-            </a:r>
-            <a:endParaRPr lang="en-US" dirty="0" smtClean="0"/>
-          </a:p>
-        </p:txBody>
-      </p:sp>
-    </p:spTree>
-  </p:cSld>
-  <p:clrMapOvr>
-    <a:masterClrMapping/>
-  </p:clrMapOvr>
-  <p:transition>
-    <p:fade/>
-  </p:transition>
-  <p:timing>
-    <p:tnLst>
-      <p:par>
-        <p:cTn id="1" dur="indefinite" restart="never" nodeType="tmRoot"/>
-      </p:par>
-    </p:tnLst>
-  </p:timing>
-</p:sld>
-</file>
-
-<file path=ppt/slides/slide25.xml><?xml version="1.0" encoding="utf-8"?>
+<file path=ppt/slides/slide22.xml><?xml version="1.0" encoding="utf-8"?>
 <p:sld xmlns:a="http://schemas.openxmlformats.org/drawingml/2006/main" xmlns:r="http://schemas.openxmlformats.org/officeDocument/2006/relationships" xmlns:p="http://schemas.openxmlformats.org/presentationml/2006/main">
   <p:cSld>
     <p:spTree>
@@ -11334,8 +10791,13 @@
             <a:pPr lvl="1"/>
             <a:r>
               <a:rPr lang="en-US" dirty="0" smtClean="0"/>
-              <a:t>Should not modify state on the server</a:t>
-            </a:r>
+              <a:t>Should </a:t>
+            </a:r>
+            <a:r>
+              <a:rPr lang="en-US" dirty="0" smtClean="0"/>
+              <a:t>be “safe”</a:t>
+            </a:r>
+            <a:endParaRPr lang="en-US" dirty="0" smtClean="0"/>
           </a:p>
           <a:p>
             <a:r>
@@ -11347,14 +10809,11 @@
             <a:pPr lvl="1"/>
             <a:r>
               <a:rPr lang="en-US" dirty="0" smtClean="0"/>
-              <a:t>“Controls” are input elements inside a form element</a:t>
-            </a:r>
-          </a:p>
-          <a:p>
-            <a:pPr lvl="1"/>
+              <a:t>Values </a:t>
+            </a:r>
             <a:r>
               <a:rPr lang="en-US" dirty="0" smtClean="0"/>
-              <a:t>Values of input elements submitted by browser as name-value pairs</a:t>
+              <a:t>of input elements submitted by browser as name-value pairs</a:t>
             </a:r>
           </a:p>
           <a:p>
@@ -11377,7 +10836,7 @@
         </p:nvSpPr>
         <p:spPr bwMode="auto">
           <a:xfrm>
-            <a:off x="1143000" y="4114800"/>
+            <a:off x="1219200" y="3962400"/>
             <a:ext cx="6629400" cy="2514600"/>
           </a:xfrm>
           <a:prstGeom prst="rect">
@@ -16086,7 +15545,7 @@
         </p:nvSpPr>
         <p:spPr bwMode="auto">
           <a:xfrm>
-            <a:off x="304800" y="2819400"/>
+            <a:off x="304800" y="3048000"/>
             <a:ext cx="8610600" cy="3124200"/>
           </a:xfrm>
           <a:prstGeom prst="rect">

</xml_diff>